<commit_message>
#325 More improvements to SBE documentation, based on review comments.
</commit_message>
<xml_diff>
--- a/cif/org.eclipse.escet.cif.documentation/images/synthesis-based-engineering/approaches/process_model_based.pptx
+++ b/cif/org.eclipse.escet.cif.documentation/images/synthesis-based-engineering/approaches/process_model_based.pptx
@@ -493,7 +493,7 @@
           <a:p>
             <a:fld id="{D965D5E7-AD3D-4631-AD8E-298F87323C43}" type="datetimeFigureOut">
               <a:rPr lang="nl-NL" smtClean="0"/>
-              <a:t>13-3-2022</a:t>
+              <a:t>20-3-2022</a:t>
             </a:fld>
             <a:endParaRPr lang="nl-NL"/>
           </a:p>
@@ -693,7 +693,7 @@
           <a:p>
             <a:fld id="{D965D5E7-AD3D-4631-AD8E-298F87323C43}" type="datetimeFigureOut">
               <a:rPr lang="nl-NL" smtClean="0"/>
-              <a:t>13-3-2022</a:t>
+              <a:t>20-3-2022</a:t>
             </a:fld>
             <a:endParaRPr lang="nl-NL"/>
           </a:p>
@@ -903,7 +903,7 @@
           <a:p>
             <a:fld id="{D965D5E7-AD3D-4631-AD8E-298F87323C43}" type="datetimeFigureOut">
               <a:rPr lang="nl-NL" smtClean="0"/>
-              <a:t>13-3-2022</a:t>
+              <a:t>20-3-2022</a:t>
             </a:fld>
             <a:endParaRPr lang="nl-NL"/>
           </a:p>
@@ -1103,7 +1103,7 @@
           <a:p>
             <a:fld id="{D965D5E7-AD3D-4631-AD8E-298F87323C43}" type="datetimeFigureOut">
               <a:rPr lang="nl-NL" smtClean="0"/>
-              <a:t>13-3-2022</a:t>
+              <a:t>20-3-2022</a:t>
             </a:fld>
             <a:endParaRPr lang="nl-NL"/>
           </a:p>
@@ -1379,7 +1379,7 @@
           <a:p>
             <a:fld id="{D965D5E7-AD3D-4631-AD8E-298F87323C43}" type="datetimeFigureOut">
               <a:rPr lang="nl-NL" smtClean="0"/>
-              <a:t>13-3-2022</a:t>
+              <a:t>20-3-2022</a:t>
             </a:fld>
             <a:endParaRPr lang="nl-NL"/>
           </a:p>
@@ -1647,7 +1647,7 @@
           <a:p>
             <a:fld id="{D965D5E7-AD3D-4631-AD8E-298F87323C43}" type="datetimeFigureOut">
               <a:rPr lang="nl-NL" smtClean="0"/>
-              <a:t>13-3-2022</a:t>
+              <a:t>20-3-2022</a:t>
             </a:fld>
             <a:endParaRPr lang="nl-NL"/>
           </a:p>
@@ -2062,7 +2062,7 @@
           <a:p>
             <a:fld id="{D965D5E7-AD3D-4631-AD8E-298F87323C43}" type="datetimeFigureOut">
               <a:rPr lang="nl-NL" smtClean="0"/>
-              <a:t>13-3-2022</a:t>
+              <a:t>20-3-2022</a:t>
             </a:fld>
             <a:endParaRPr lang="nl-NL"/>
           </a:p>
@@ -2204,7 +2204,7 @@
           <a:p>
             <a:fld id="{D965D5E7-AD3D-4631-AD8E-298F87323C43}" type="datetimeFigureOut">
               <a:rPr lang="nl-NL" smtClean="0"/>
-              <a:t>13-3-2022</a:t>
+              <a:t>20-3-2022</a:t>
             </a:fld>
             <a:endParaRPr lang="nl-NL"/>
           </a:p>
@@ -2317,7 +2317,7 @@
           <a:p>
             <a:fld id="{D965D5E7-AD3D-4631-AD8E-298F87323C43}" type="datetimeFigureOut">
               <a:rPr lang="nl-NL" smtClean="0"/>
-              <a:t>13-3-2022</a:t>
+              <a:t>20-3-2022</a:t>
             </a:fld>
             <a:endParaRPr lang="nl-NL"/>
           </a:p>
@@ -2630,7 +2630,7 @@
           <a:p>
             <a:fld id="{D965D5E7-AD3D-4631-AD8E-298F87323C43}" type="datetimeFigureOut">
               <a:rPr lang="nl-NL" smtClean="0"/>
-              <a:t>13-3-2022</a:t>
+              <a:t>20-3-2022</a:t>
             </a:fld>
             <a:endParaRPr lang="nl-NL"/>
           </a:p>
@@ -2919,7 +2919,7 @@
           <a:p>
             <a:fld id="{D965D5E7-AD3D-4631-AD8E-298F87323C43}" type="datetimeFigureOut">
               <a:rPr lang="nl-NL" smtClean="0"/>
-              <a:t>13-3-2022</a:t>
+              <a:t>20-3-2022</a:t>
             </a:fld>
             <a:endParaRPr lang="nl-NL"/>
           </a:p>
@@ -3162,7 +3162,7 @@
           <a:p>
             <a:fld id="{D965D5E7-AD3D-4631-AD8E-298F87323C43}" type="datetimeFigureOut">
               <a:rPr lang="nl-NL" smtClean="0"/>
-              <a:t>13-3-2022</a:t>
+              <a:t>20-3-2022</a:t>
             </a:fld>
             <a:endParaRPr lang="nl-NL"/>
           </a:p>
@@ -3699,12 +3699,12 @@
           <a:p>
             <a:pPr algn="ctr"/>
             <a:r>
-              <a:rPr lang="en-US" sz="2000">
+              <a:rPr lang="en-US" sz="2000" dirty="0">
                 <a:solidFill>
                   <a:sysClr val="windowText" lastClr="000000"/>
                 </a:solidFill>
               </a:rPr>
-              <a:t>Controller model (supervisor model)</a:t>
+              <a:t>Controller model</a:t>
             </a:r>
           </a:p>
         </p:txBody>

</xml_diff>